<commit_message>
feat: Integrate `chatId` into chat and message handling across API and UI components.
</commit_message>
<xml_diff>
--- a/@Apresentação da Disciplina.pptx
+++ b/@Apresentação da Disciplina.pptx
@@ -4,10 +4,13 @@
   <p:sldMasterIdLst>
     <p:sldMasterId id="2147483648" r:id="rId1"/>
   </p:sldMasterIdLst>
+  <p:notesMasterIdLst>
+    <p:notesMasterId r:id="rId8"/>
+  </p:notesMasterIdLst>
   <p:sldIdLst>
     <p:sldId id="266" r:id="rId2"/>
-    <p:sldId id="257" r:id="rId3"/>
-    <p:sldId id="256" r:id="rId4"/>
+    <p:sldId id="256" r:id="rId3"/>
+    <p:sldId id="257" r:id="rId4"/>
     <p:sldId id="262" r:id="rId5"/>
     <p:sldId id="263" r:id="rId6"/>
     <p:sldId id="265" r:id="rId7"/>
@@ -128,6 +131,439 @@
 </p:presentation>
 </file>
 
+<file path=ppt/notesMasters/notesMaster1.xml><?xml version="1.0" encoding="utf-8"?>
+<p:notesMaster xmlns:a="http://schemas.openxmlformats.org/drawingml/2006/main" xmlns:r="http://schemas.openxmlformats.org/officeDocument/2006/relationships" xmlns:p="http://schemas.openxmlformats.org/presentationml/2006/main">
+  <p:cSld>
+    <p:bg>
+      <p:bgRef idx="1001">
+        <a:schemeClr val="bg1"/>
+      </p:bgRef>
+    </p:bg>
+    <p:spTree>
+      <p:nvGrpSpPr>
+        <p:cNvPr id="1" name=""/>
+        <p:cNvGrpSpPr/>
+        <p:nvPr/>
+      </p:nvGrpSpPr>
+      <p:grpSpPr>
+        <a:xfrm>
+          <a:off x="0" y="0"/>
+          <a:ext cx="0" cy="0"/>
+          <a:chOff x="0" y="0"/>
+          <a:chExt cx="0" cy="0"/>
+        </a:xfrm>
+      </p:grpSpPr>
+      <p:sp>
+        <p:nvSpPr>
+          <p:cNvPr id="2" name="Espaço Reservado para Cabeçalho 1"/>
+          <p:cNvSpPr>
+            <a:spLocks noGrp="1"/>
+          </p:cNvSpPr>
+          <p:nvPr>
+            <p:ph type="hdr" sz="quarter"/>
+          </p:nvPr>
+        </p:nvSpPr>
+        <p:spPr>
+          <a:xfrm>
+            <a:off x="0" y="0"/>
+            <a:ext cx="2971800" cy="458788"/>
+          </a:xfrm>
+          <a:prstGeom prst="rect">
+            <a:avLst/>
+          </a:prstGeom>
+        </p:spPr>
+        <p:txBody>
+          <a:bodyPr vert="horz" lIns="91440" tIns="45720" rIns="91440" bIns="45720" rtlCol="0"/>
+          <a:lstStyle>
+            <a:lvl1pPr algn="l">
+              <a:defRPr sz="1200"/>
+            </a:lvl1pPr>
+          </a:lstStyle>
+          <a:p>
+            <a:endParaRPr lang="pt-BR"/>
+          </a:p>
+        </p:txBody>
+      </p:sp>
+      <p:sp>
+        <p:nvSpPr>
+          <p:cNvPr id="3" name="Espaço Reservado para Data 2"/>
+          <p:cNvSpPr>
+            <a:spLocks noGrp="1"/>
+          </p:cNvSpPr>
+          <p:nvPr>
+            <p:ph type="dt" idx="1"/>
+          </p:nvPr>
+        </p:nvSpPr>
+        <p:spPr>
+          <a:xfrm>
+            <a:off x="3884613" y="0"/>
+            <a:ext cx="2971800" cy="458788"/>
+          </a:xfrm>
+          <a:prstGeom prst="rect">
+            <a:avLst/>
+          </a:prstGeom>
+        </p:spPr>
+        <p:txBody>
+          <a:bodyPr vert="horz" lIns="91440" tIns="45720" rIns="91440" bIns="45720" rtlCol="0"/>
+          <a:lstStyle>
+            <a:lvl1pPr algn="r">
+              <a:defRPr sz="1200"/>
+            </a:lvl1pPr>
+          </a:lstStyle>
+          <a:p>
+            <a:fld id="{1AE5E27F-B960-486D-B812-9F48CB4EF9F3}" type="datetimeFigureOut">
+              <a:rPr lang="pt-BR" smtClean="0"/>
+              <a:t>09/02/2026</a:t>
+            </a:fld>
+            <a:endParaRPr lang="pt-BR"/>
+          </a:p>
+        </p:txBody>
+      </p:sp>
+      <p:sp>
+        <p:nvSpPr>
+          <p:cNvPr id="4" name="Espaço Reservado para Imagem de Slide 3"/>
+          <p:cNvSpPr>
+            <a:spLocks noGrp="1" noRot="1" noChangeAspect="1"/>
+          </p:cNvSpPr>
+          <p:nvPr>
+            <p:ph type="sldImg" idx="2"/>
+          </p:nvPr>
+        </p:nvSpPr>
+        <p:spPr>
+          <a:xfrm>
+            <a:off x="1371600" y="1143000"/>
+            <a:ext cx="4114800" cy="3086100"/>
+          </a:xfrm>
+          <a:prstGeom prst="rect">
+            <a:avLst/>
+          </a:prstGeom>
+          <a:noFill/>
+          <a:ln w="12700">
+            <a:solidFill>
+              <a:prstClr val="black"/>
+            </a:solidFill>
+          </a:ln>
+        </p:spPr>
+        <p:txBody>
+          <a:bodyPr vert="horz" lIns="91440" tIns="45720" rIns="91440" bIns="45720" rtlCol="0" anchor="ctr"/>
+          <a:lstStyle/>
+          <a:p>
+            <a:endParaRPr lang="pt-BR"/>
+          </a:p>
+        </p:txBody>
+      </p:sp>
+      <p:sp>
+        <p:nvSpPr>
+          <p:cNvPr id="5" name="Espaço Reservado para Anotações 4"/>
+          <p:cNvSpPr>
+            <a:spLocks noGrp="1"/>
+          </p:cNvSpPr>
+          <p:nvPr>
+            <p:ph type="body" sz="quarter" idx="3"/>
+          </p:nvPr>
+        </p:nvSpPr>
+        <p:spPr>
+          <a:xfrm>
+            <a:off x="685800" y="4400550"/>
+            <a:ext cx="5486400" cy="3600450"/>
+          </a:xfrm>
+          <a:prstGeom prst="rect">
+            <a:avLst/>
+          </a:prstGeom>
+        </p:spPr>
+        <p:txBody>
+          <a:bodyPr vert="horz" lIns="91440" tIns="45720" rIns="91440" bIns="45720" rtlCol="0"/>
+          <a:lstStyle/>
+          <a:p>
+            <a:pPr lvl="0"/>
+            <a:r>
+              <a:rPr lang="pt-BR"/>
+              <a:t>Clique para editar os estilos de texto Mestres</a:t>
+            </a:r>
+          </a:p>
+          <a:p>
+            <a:pPr lvl="1"/>
+            <a:r>
+              <a:rPr lang="pt-BR"/>
+              <a:t>Segundo nível</a:t>
+            </a:r>
+          </a:p>
+          <a:p>
+            <a:pPr lvl="2"/>
+            <a:r>
+              <a:rPr lang="pt-BR"/>
+              <a:t>Terceiro nível</a:t>
+            </a:r>
+          </a:p>
+          <a:p>
+            <a:pPr lvl="3"/>
+            <a:r>
+              <a:rPr lang="pt-BR"/>
+              <a:t>Quarto nível</a:t>
+            </a:r>
+          </a:p>
+          <a:p>
+            <a:pPr lvl="4"/>
+            <a:r>
+              <a:rPr lang="pt-BR"/>
+              <a:t>Quinto nível</a:t>
+            </a:r>
+          </a:p>
+        </p:txBody>
+      </p:sp>
+      <p:sp>
+        <p:nvSpPr>
+          <p:cNvPr id="6" name="Espaço Reservado para Rodapé 5"/>
+          <p:cNvSpPr>
+            <a:spLocks noGrp="1"/>
+          </p:cNvSpPr>
+          <p:nvPr>
+            <p:ph type="ftr" sz="quarter" idx="4"/>
+          </p:nvPr>
+        </p:nvSpPr>
+        <p:spPr>
+          <a:xfrm>
+            <a:off x="0" y="8685213"/>
+            <a:ext cx="2971800" cy="458787"/>
+          </a:xfrm>
+          <a:prstGeom prst="rect">
+            <a:avLst/>
+          </a:prstGeom>
+        </p:spPr>
+        <p:txBody>
+          <a:bodyPr vert="horz" lIns="91440" tIns="45720" rIns="91440" bIns="45720" rtlCol="0" anchor="b"/>
+          <a:lstStyle>
+            <a:lvl1pPr algn="l">
+              <a:defRPr sz="1200"/>
+            </a:lvl1pPr>
+          </a:lstStyle>
+          <a:p>
+            <a:endParaRPr lang="pt-BR"/>
+          </a:p>
+        </p:txBody>
+      </p:sp>
+      <p:sp>
+        <p:nvSpPr>
+          <p:cNvPr id="7" name="Espaço Reservado para Número de Slide 6"/>
+          <p:cNvSpPr>
+            <a:spLocks noGrp="1"/>
+          </p:cNvSpPr>
+          <p:nvPr>
+            <p:ph type="sldNum" sz="quarter" idx="5"/>
+          </p:nvPr>
+        </p:nvSpPr>
+        <p:spPr>
+          <a:xfrm>
+            <a:off x="3884613" y="8685213"/>
+            <a:ext cx="2971800" cy="458787"/>
+          </a:xfrm>
+          <a:prstGeom prst="rect">
+            <a:avLst/>
+          </a:prstGeom>
+        </p:spPr>
+        <p:txBody>
+          <a:bodyPr vert="horz" lIns="91440" tIns="45720" rIns="91440" bIns="45720" rtlCol="0" anchor="b"/>
+          <a:lstStyle>
+            <a:lvl1pPr algn="r">
+              <a:defRPr sz="1200"/>
+            </a:lvl1pPr>
+          </a:lstStyle>
+          <a:p>
+            <a:fld id="{1437FC18-598C-4303-8AC8-1EF4278E85B6}" type="slidenum">
+              <a:rPr lang="pt-BR" smtClean="0"/>
+              <a:t>‹nº›</a:t>
+            </a:fld>
+            <a:endParaRPr lang="pt-BR"/>
+          </a:p>
+        </p:txBody>
+      </p:sp>
+    </p:spTree>
+    <p:extLst>
+      <p:ext uri="{BB962C8B-B14F-4D97-AF65-F5344CB8AC3E}">
+        <p14:creationId xmlns:p14="http://schemas.microsoft.com/office/powerpoint/2010/main" val="1128704748"/>
+      </p:ext>
+    </p:extLst>
+  </p:cSld>
+  <p:clrMap bg1="lt1" tx1="dk1" bg2="lt2" tx2="dk2" accent1="accent1" accent2="accent2" accent3="accent3" accent4="accent4" accent5="accent5" accent6="accent6" hlink="hlink" folHlink="folHlink"/>
+  <p:notesStyle>
+    <a:lvl1pPr marL="0" algn="l" defTabSz="914400" rtl="0" eaLnBrk="1" latinLnBrk="0" hangingPunct="1">
+      <a:defRPr sz="1200" kern="1200">
+        <a:solidFill>
+          <a:schemeClr val="tx1"/>
+        </a:solidFill>
+        <a:latin typeface="+mn-lt"/>
+        <a:ea typeface="+mn-ea"/>
+        <a:cs typeface="+mn-cs"/>
+      </a:defRPr>
+    </a:lvl1pPr>
+    <a:lvl2pPr marL="457200" algn="l" defTabSz="914400" rtl="0" eaLnBrk="1" latinLnBrk="0" hangingPunct="1">
+      <a:defRPr sz="1200" kern="1200">
+        <a:solidFill>
+          <a:schemeClr val="tx1"/>
+        </a:solidFill>
+        <a:latin typeface="+mn-lt"/>
+        <a:ea typeface="+mn-ea"/>
+        <a:cs typeface="+mn-cs"/>
+      </a:defRPr>
+    </a:lvl2pPr>
+    <a:lvl3pPr marL="914400" algn="l" defTabSz="914400" rtl="0" eaLnBrk="1" latinLnBrk="0" hangingPunct="1">
+      <a:defRPr sz="1200" kern="1200">
+        <a:solidFill>
+          <a:schemeClr val="tx1"/>
+        </a:solidFill>
+        <a:latin typeface="+mn-lt"/>
+        <a:ea typeface="+mn-ea"/>
+        <a:cs typeface="+mn-cs"/>
+      </a:defRPr>
+    </a:lvl3pPr>
+    <a:lvl4pPr marL="1371600" algn="l" defTabSz="914400" rtl="0" eaLnBrk="1" latinLnBrk="0" hangingPunct="1">
+      <a:defRPr sz="1200" kern="1200">
+        <a:solidFill>
+          <a:schemeClr val="tx1"/>
+        </a:solidFill>
+        <a:latin typeface="+mn-lt"/>
+        <a:ea typeface="+mn-ea"/>
+        <a:cs typeface="+mn-cs"/>
+      </a:defRPr>
+    </a:lvl4pPr>
+    <a:lvl5pPr marL="1828800" algn="l" defTabSz="914400" rtl="0" eaLnBrk="1" latinLnBrk="0" hangingPunct="1">
+      <a:defRPr sz="1200" kern="1200">
+        <a:solidFill>
+          <a:schemeClr val="tx1"/>
+        </a:solidFill>
+        <a:latin typeface="+mn-lt"/>
+        <a:ea typeface="+mn-ea"/>
+        <a:cs typeface="+mn-cs"/>
+      </a:defRPr>
+    </a:lvl5pPr>
+    <a:lvl6pPr marL="2286000" algn="l" defTabSz="914400" rtl="0" eaLnBrk="1" latinLnBrk="0" hangingPunct="1">
+      <a:defRPr sz="1200" kern="1200">
+        <a:solidFill>
+          <a:schemeClr val="tx1"/>
+        </a:solidFill>
+        <a:latin typeface="+mn-lt"/>
+        <a:ea typeface="+mn-ea"/>
+        <a:cs typeface="+mn-cs"/>
+      </a:defRPr>
+    </a:lvl6pPr>
+    <a:lvl7pPr marL="2743200" algn="l" defTabSz="914400" rtl="0" eaLnBrk="1" latinLnBrk="0" hangingPunct="1">
+      <a:defRPr sz="1200" kern="1200">
+        <a:solidFill>
+          <a:schemeClr val="tx1"/>
+        </a:solidFill>
+        <a:latin typeface="+mn-lt"/>
+        <a:ea typeface="+mn-ea"/>
+        <a:cs typeface="+mn-cs"/>
+      </a:defRPr>
+    </a:lvl7pPr>
+    <a:lvl8pPr marL="3200400" algn="l" defTabSz="914400" rtl="0" eaLnBrk="1" latinLnBrk="0" hangingPunct="1">
+      <a:defRPr sz="1200" kern="1200">
+        <a:solidFill>
+          <a:schemeClr val="tx1"/>
+        </a:solidFill>
+        <a:latin typeface="+mn-lt"/>
+        <a:ea typeface="+mn-ea"/>
+        <a:cs typeface="+mn-cs"/>
+      </a:defRPr>
+    </a:lvl8pPr>
+    <a:lvl9pPr marL="3657600" algn="l" defTabSz="914400" rtl="0" eaLnBrk="1" latinLnBrk="0" hangingPunct="1">
+      <a:defRPr sz="1200" kern="1200">
+        <a:solidFill>
+          <a:schemeClr val="tx1"/>
+        </a:solidFill>
+        <a:latin typeface="+mn-lt"/>
+        <a:ea typeface="+mn-ea"/>
+        <a:cs typeface="+mn-cs"/>
+      </a:defRPr>
+    </a:lvl9pPr>
+  </p:notesStyle>
+</p:notesMaster>
+</file>
+
+<file path=ppt/notesSlides/notesSlide1.xml><?xml version="1.0" encoding="utf-8"?>
+<p:notes xmlns:a="http://schemas.openxmlformats.org/drawingml/2006/main" xmlns:r="http://schemas.openxmlformats.org/officeDocument/2006/relationships" xmlns:p="http://schemas.openxmlformats.org/presentationml/2006/main">
+  <p:cSld>
+    <p:spTree>
+      <p:nvGrpSpPr>
+        <p:cNvPr id="1" name=""/>
+        <p:cNvGrpSpPr/>
+        <p:nvPr/>
+      </p:nvGrpSpPr>
+      <p:grpSpPr>
+        <a:xfrm>
+          <a:off x="0" y="0"/>
+          <a:ext cx="0" cy="0"/>
+          <a:chOff x="0" y="0"/>
+          <a:chExt cx="0" cy="0"/>
+        </a:xfrm>
+      </p:grpSpPr>
+      <p:sp>
+        <p:nvSpPr>
+          <p:cNvPr id="2" name="Espaço Reservado para Imagem de Slide 1"/>
+          <p:cNvSpPr>
+            <a:spLocks noGrp="1" noRot="1" noChangeAspect="1"/>
+          </p:cNvSpPr>
+          <p:nvPr>
+            <p:ph type="sldImg"/>
+          </p:nvPr>
+        </p:nvSpPr>
+        <p:spPr/>
+      </p:sp>
+      <p:sp>
+        <p:nvSpPr>
+          <p:cNvPr id="3" name="Espaço Reservado para Anotações 2"/>
+          <p:cNvSpPr>
+            <a:spLocks noGrp="1"/>
+          </p:cNvSpPr>
+          <p:nvPr>
+            <p:ph type="body" idx="1"/>
+          </p:nvPr>
+        </p:nvSpPr>
+        <p:spPr/>
+        <p:txBody>
+          <a:bodyPr/>
+          <a:lstStyle/>
+          <a:p>
+            <a:endParaRPr lang="pt-BR" dirty="0"/>
+          </a:p>
+        </p:txBody>
+      </p:sp>
+      <p:sp>
+        <p:nvSpPr>
+          <p:cNvPr id="4" name="Espaço Reservado para Número de Slide 3"/>
+          <p:cNvSpPr>
+            <a:spLocks noGrp="1"/>
+          </p:cNvSpPr>
+          <p:nvPr>
+            <p:ph type="sldNum" sz="quarter" idx="5"/>
+          </p:nvPr>
+        </p:nvSpPr>
+        <p:spPr/>
+        <p:txBody>
+          <a:bodyPr/>
+          <a:lstStyle/>
+          <a:p>
+            <a:fld id="{1437FC18-598C-4303-8AC8-1EF4278E85B6}" type="slidenum">
+              <a:rPr lang="pt-BR" smtClean="0"/>
+              <a:t>1</a:t>
+            </a:fld>
+            <a:endParaRPr lang="pt-BR"/>
+          </a:p>
+        </p:txBody>
+      </p:sp>
+    </p:spTree>
+    <p:extLst>
+      <p:ext uri="{BB962C8B-B14F-4D97-AF65-F5344CB8AC3E}">
+        <p14:creationId xmlns:p14="http://schemas.microsoft.com/office/powerpoint/2010/main" val="764047655"/>
+      </p:ext>
+    </p:extLst>
+  </p:cSld>
+  <p:clrMapOvr>
+    <a:masterClrMapping/>
+  </p:clrMapOvr>
+</p:notes>
+</file>
+
 <file path=ppt/slideLayouts/slideLayout1.xml><?xml version="1.0" encoding="utf-8"?>
 <p:sldLayout xmlns:a="http://schemas.openxmlformats.org/drawingml/2006/main" xmlns:r="http://schemas.openxmlformats.org/officeDocument/2006/relationships" xmlns:p="http://schemas.openxmlformats.org/presentationml/2006/main" type="title" preserve="1">
   <p:cSld name="Slide de título">
@@ -307,7 +743,7 @@
           <a:p>
             <a:fld id="{A061563A-35C7-49EE-9FEB-8EB53781E0B1}" type="datetimeFigureOut">
               <a:rPr lang="pt-BR" smtClean="0"/>
-              <a:t>07/02/2026</a:t>
+              <a:t>09/02/2026</a:t>
             </a:fld>
             <a:endParaRPr lang="pt-BR" dirty="0"/>
           </a:p>
@@ -475,7 +911,7 @@
           <a:p>
             <a:fld id="{A061563A-35C7-49EE-9FEB-8EB53781E0B1}" type="datetimeFigureOut">
               <a:rPr lang="pt-BR" smtClean="0"/>
-              <a:t>07/02/2026</a:t>
+              <a:t>09/02/2026</a:t>
             </a:fld>
             <a:endParaRPr lang="pt-BR" dirty="0"/>
           </a:p>
@@ -653,7 +1089,7 @@
           <a:p>
             <a:fld id="{A061563A-35C7-49EE-9FEB-8EB53781E0B1}" type="datetimeFigureOut">
               <a:rPr lang="pt-BR" smtClean="0"/>
-              <a:t>07/02/2026</a:t>
+              <a:t>09/02/2026</a:t>
             </a:fld>
             <a:endParaRPr lang="pt-BR" dirty="0"/>
           </a:p>
@@ -821,7 +1257,7 @@
           <a:p>
             <a:fld id="{A061563A-35C7-49EE-9FEB-8EB53781E0B1}" type="datetimeFigureOut">
               <a:rPr lang="pt-BR" smtClean="0"/>
-              <a:t>07/02/2026</a:t>
+              <a:t>09/02/2026</a:t>
             </a:fld>
             <a:endParaRPr lang="pt-BR" dirty="0"/>
           </a:p>
@@ -1066,7 +1502,7 @@
           <a:p>
             <a:fld id="{A061563A-35C7-49EE-9FEB-8EB53781E0B1}" type="datetimeFigureOut">
               <a:rPr lang="pt-BR" smtClean="0"/>
-              <a:t>07/02/2026</a:t>
+              <a:t>09/02/2026</a:t>
             </a:fld>
             <a:endParaRPr lang="pt-BR" dirty="0"/>
           </a:p>
@@ -1351,7 +1787,7 @@
           <a:p>
             <a:fld id="{A061563A-35C7-49EE-9FEB-8EB53781E0B1}" type="datetimeFigureOut">
               <a:rPr lang="pt-BR" smtClean="0"/>
-              <a:t>07/02/2026</a:t>
+              <a:t>09/02/2026</a:t>
             </a:fld>
             <a:endParaRPr lang="pt-BR" dirty="0"/>
           </a:p>
@@ -1770,7 +2206,7 @@
           <a:p>
             <a:fld id="{A061563A-35C7-49EE-9FEB-8EB53781E0B1}" type="datetimeFigureOut">
               <a:rPr lang="pt-BR" smtClean="0"/>
-              <a:t>07/02/2026</a:t>
+              <a:t>09/02/2026</a:t>
             </a:fld>
             <a:endParaRPr lang="pt-BR" dirty="0"/>
           </a:p>
@@ -1887,7 +2323,7 @@
           <a:p>
             <a:fld id="{A061563A-35C7-49EE-9FEB-8EB53781E0B1}" type="datetimeFigureOut">
               <a:rPr lang="pt-BR" smtClean="0"/>
-              <a:t>07/02/2026</a:t>
+              <a:t>09/02/2026</a:t>
             </a:fld>
             <a:endParaRPr lang="pt-BR" dirty="0"/>
           </a:p>
@@ -1982,7 +2418,7 @@
           <a:p>
             <a:fld id="{A061563A-35C7-49EE-9FEB-8EB53781E0B1}" type="datetimeFigureOut">
               <a:rPr lang="pt-BR" smtClean="0"/>
-              <a:t>07/02/2026</a:t>
+              <a:t>09/02/2026</a:t>
             </a:fld>
             <a:endParaRPr lang="pt-BR" dirty="0"/>
           </a:p>
@@ -2257,7 +2693,7 @@
           <a:p>
             <a:fld id="{A061563A-35C7-49EE-9FEB-8EB53781E0B1}" type="datetimeFigureOut">
               <a:rPr lang="pt-BR" smtClean="0"/>
-              <a:t>07/02/2026</a:t>
+              <a:t>09/02/2026</a:t>
             </a:fld>
             <a:endParaRPr lang="pt-BR" dirty="0"/>
           </a:p>
@@ -2509,7 +2945,7 @@
           <a:p>
             <a:fld id="{A061563A-35C7-49EE-9FEB-8EB53781E0B1}" type="datetimeFigureOut">
               <a:rPr lang="pt-BR" smtClean="0"/>
-              <a:t>07/02/2026</a:t>
+              <a:t>09/02/2026</a:t>
             </a:fld>
             <a:endParaRPr lang="pt-BR" dirty="0"/>
           </a:p>
@@ -2723,7 +3159,7 @@
           <a:p>
             <a:fld id="{A061563A-35C7-49EE-9FEB-8EB53781E0B1}" type="datetimeFigureOut">
               <a:rPr lang="pt-BR" smtClean="0"/>
-              <a:t>07/02/2026</a:t>
+              <a:t>09/02/2026</a:t>
             </a:fld>
             <a:endParaRPr lang="pt-BR" dirty="0"/>
           </a:p>
@@ -3119,7 +3555,7 @@
           <p:nvPr/>
         </p:nvPicPr>
         <p:blipFill>
-          <a:blip r:embed="rId2"/>
+          <a:blip r:embed="rId3"/>
           <a:stretch>
             <a:fillRect/>
           </a:stretch>
@@ -3149,7 +3585,7 @@
           <p:nvPr/>
         </p:nvPicPr>
         <p:blipFill>
-          <a:blip r:embed="rId3">
+          <a:blip r:embed="rId4">
             <a:extLst>
               <a:ext uri="{28A0092B-C50C-407E-A947-70E740481C1C}">
                 <a14:useLocalDpi xmlns:a14="http://schemas.microsoft.com/office/drawing/2010/main" val="0"/>
@@ -3184,7 +3620,7 @@
           <p:nvPr/>
         </p:nvPicPr>
         <p:blipFill>
-          <a:blip r:embed="rId4"/>
+          <a:blip r:embed="rId5"/>
           <a:stretch>
             <a:fillRect/>
           </a:stretch>
@@ -3213,8 +3649,8 @@
         </p:nvSpPr>
         <p:spPr>
           <a:xfrm>
-            <a:off x="0" y="4694664"/>
-            <a:ext cx="9141647" cy="2046714"/>
+            <a:off x="0" y="4600586"/>
+            <a:ext cx="9141647" cy="2262158"/>
           </a:xfrm>
           <a:prstGeom prst="rect">
             <a:avLst/>
@@ -3232,7 +3668,7 @@
               <a:buChar char="•"/>
             </a:pPr>
             <a:r>
-              <a:rPr lang="pt-BR" sz="1600" b="1" i="0" dirty="0">
+              <a:rPr lang="pt-BR" b="1" i="0" dirty="0">
                 <a:solidFill>
                   <a:srgbClr val="F8FAFF"/>
                 </a:solidFill>
@@ -3251,7 +3687,7 @@
               <a:buChar char="•"/>
             </a:pPr>
             <a:r>
-              <a:rPr lang="pt-BR" sz="1600" b="1" i="0" dirty="0">
+              <a:rPr lang="pt-BR" b="1" i="0" dirty="0">
                 <a:solidFill>
                   <a:srgbClr val="F8FAFF"/>
                 </a:solidFill>
@@ -3270,7 +3706,7 @@
               <a:buChar char="•"/>
             </a:pPr>
             <a:r>
-              <a:rPr lang="pt-BR" sz="1600" b="1" i="0" dirty="0">
+              <a:rPr lang="pt-BR" b="1" i="0" dirty="0">
                 <a:solidFill>
                   <a:srgbClr val="F8FAFF"/>
                 </a:solidFill>
@@ -3289,7 +3725,7 @@
               <a:buChar char="•"/>
             </a:pPr>
             <a:r>
-              <a:rPr lang="pt-BR" sz="1600" b="1" i="0" dirty="0">
+              <a:rPr lang="pt-BR" b="1" i="0" dirty="0">
                 <a:solidFill>
                   <a:srgbClr val="F8FAFF"/>
                 </a:solidFill>
@@ -3308,7 +3744,7 @@
               <a:buChar char="•"/>
             </a:pPr>
             <a:r>
-              <a:rPr lang="pt-BR" sz="1600" b="1" i="0" dirty="0">
+              <a:rPr lang="pt-BR" b="1" i="0" dirty="0">
                 <a:solidFill>
                   <a:srgbClr val="F8FAFF"/>
                 </a:solidFill>
@@ -3327,7 +3763,7 @@
               <a:buChar char="•"/>
             </a:pPr>
             <a:r>
-              <a:rPr lang="pt-BR" sz="1600" b="1" i="0" dirty="0">
+              <a:rPr lang="pt-BR" b="1" i="0" dirty="0">
                 <a:solidFill>
                   <a:srgbClr val="F8FAFF"/>
                 </a:solidFill>
@@ -3346,7 +3782,7 @@
               <a:buChar char="•"/>
             </a:pPr>
             <a:r>
-              <a:rPr lang="pt-BR" sz="1600" b="1" i="0" dirty="0">
+              <a:rPr lang="pt-BR" b="1" i="0" dirty="0">
                 <a:solidFill>
                   <a:srgbClr val="F8FAFF"/>
                 </a:solidFill>
@@ -3372,185 +3808,6 @@
 </file>
 
 <file path=ppt/slides/slide2.xml><?xml version="1.0" encoding="utf-8"?>
-<p:sld xmlns:a="http://schemas.openxmlformats.org/drawingml/2006/main" xmlns:r="http://schemas.openxmlformats.org/officeDocument/2006/relationships" xmlns:p="http://schemas.openxmlformats.org/presentationml/2006/main">
-  <p:cSld>
-    <p:spTree>
-      <p:nvGrpSpPr>
-        <p:cNvPr id="1" name=""/>
-        <p:cNvGrpSpPr/>
-        <p:nvPr/>
-      </p:nvGrpSpPr>
-      <p:grpSpPr>
-        <a:xfrm>
-          <a:off x="0" y="0"/>
-          <a:ext cx="0" cy="0"/>
-          <a:chOff x="0" y="0"/>
-          <a:chExt cx="0" cy="0"/>
-        </a:xfrm>
-      </p:grpSpPr>
-      <p:pic>
-        <p:nvPicPr>
-          <p:cNvPr id="1028" name="Picture 4" descr="Resultado de imagem para programação"/>
-          <p:cNvPicPr>
-            <a:picLocks noChangeAspect="1" noChangeArrowheads="1"/>
-          </p:cNvPicPr>
-          <p:nvPr/>
-        </p:nvPicPr>
-        <p:blipFill>
-          <a:blip r:embed="rId2">
-            <a:extLst>
-              <a:ext uri="{28A0092B-C50C-407E-A947-70E740481C1C}">
-                <a14:useLocalDpi xmlns:a14="http://schemas.microsoft.com/office/drawing/2010/main" val="0"/>
-              </a:ext>
-            </a:extLst>
-          </a:blip>
-          <a:srcRect/>
-          <a:stretch>
-            <a:fillRect/>
-          </a:stretch>
-        </p:blipFill>
-        <p:spPr bwMode="auto">
-          <a:xfrm>
-            <a:off x="0" y="9345"/>
-            <a:ext cx="9143998" cy="6857999"/>
-          </a:xfrm>
-          <a:prstGeom prst="rect">
-            <a:avLst/>
-          </a:prstGeom>
-          <a:noFill/>
-          <a:extLst>
-            <a:ext uri="{909E8E84-426E-40DD-AFC4-6F175D3DCCD1}">
-              <a14:hiddenFill xmlns:a14="http://schemas.microsoft.com/office/drawing/2010/main">
-                <a:solidFill>
-                  <a:srgbClr val="FFFFFF"/>
-                </a:solidFill>
-              </a14:hiddenFill>
-            </a:ext>
-          </a:extLst>
-        </p:spPr>
-      </p:pic>
-      <p:sp>
-        <p:nvSpPr>
-          <p:cNvPr id="3" name="Título 1">
-            <a:extLst>
-              <a:ext uri="{FF2B5EF4-FFF2-40B4-BE49-F238E27FC236}">
-                <a16:creationId xmlns:a16="http://schemas.microsoft.com/office/drawing/2014/main" id="{AD081224-7062-42D5-AC83-0BE27E97D9B3}"/>
-              </a:ext>
-            </a:extLst>
-          </p:cNvPr>
-          <p:cNvSpPr>
-            <a:spLocks noGrp="1"/>
-          </p:cNvSpPr>
-          <p:nvPr>
-            <p:ph type="ctrTitle"/>
-          </p:nvPr>
-        </p:nvSpPr>
-        <p:spPr>
-          <a:xfrm>
-            <a:off x="-2" y="2592288"/>
-            <a:ext cx="9144000" cy="1628800"/>
-          </a:xfrm>
-          <a:solidFill>
-            <a:srgbClr val="FFFF00"/>
-          </a:solidFill>
-        </p:spPr>
-        <p:txBody>
-          <a:bodyPr>
-            <a:noAutofit/>
-          </a:bodyPr>
-          <a:lstStyle/>
-          <a:p>
-            <a:r>
-              <a:rPr lang="pt-BR" sz="8800" b="1" dirty="0">
-                <a:solidFill>
-                  <a:srgbClr val="7030A0"/>
-                </a:solidFill>
-                <a:latin typeface="Impact" panose="020B0806030902050204" pitchFamily="34" charset="0"/>
-                <a:cs typeface="Arial" pitchFamily="34" charset="0"/>
-              </a:rPr>
-              <a:t>“</a:t>
-            </a:r>
-            <a:r>
-              <a:rPr lang="pt-BR" sz="8800" b="1" dirty="0">
-                <a:latin typeface="Impact" panose="020B0806030902050204" pitchFamily="34" charset="0"/>
-                <a:cs typeface="Arial" pitchFamily="34" charset="0"/>
-              </a:rPr>
-              <a:t>A</a:t>
-            </a:r>
-            <a:r>
-              <a:rPr lang="pt-BR" sz="8800" b="1" dirty="0">
-                <a:solidFill>
-                  <a:srgbClr val="00B050"/>
-                </a:solidFill>
-                <a:latin typeface="Impact" panose="020B0806030902050204" pitchFamily="34" charset="0"/>
-                <a:cs typeface="Arial" pitchFamily="34" charset="0"/>
-              </a:rPr>
-              <a:t>PRE</a:t>
-            </a:r>
-            <a:r>
-              <a:rPr lang="pt-BR" sz="8800" b="1" dirty="0">
-                <a:solidFill>
-                  <a:srgbClr val="7030A0"/>
-                </a:solidFill>
-                <a:latin typeface="Impact" panose="020B0806030902050204" pitchFamily="34" charset="0"/>
-                <a:cs typeface="Arial" pitchFamily="34" charset="0"/>
-              </a:rPr>
-              <a:t>SEN</a:t>
-            </a:r>
-            <a:r>
-              <a:rPr lang="pt-BR" sz="8800" b="1" dirty="0">
-                <a:solidFill>
-                  <a:srgbClr val="00B0F0"/>
-                </a:solidFill>
-                <a:latin typeface="Impact" panose="020B0806030902050204" pitchFamily="34" charset="0"/>
-                <a:cs typeface="Arial" pitchFamily="34" charset="0"/>
-              </a:rPr>
-              <a:t>TA</a:t>
-            </a:r>
-            <a:r>
-              <a:rPr lang="pt-BR" sz="8800" b="1" dirty="0">
-                <a:solidFill>
-                  <a:srgbClr val="FFC000"/>
-                </a:solidFill>
-                <a:latin typeface="Impact" panose="020B0806030902050204" pitchFamily="34" charset="0"/>
-                <a:cs typeface="Arial" pitchFamily="34" charset="0"/>
-              </a:rPr>
-              <a:t>ÇÃO</a:t>
-            </a:r>
-            <a:r>
-              <a:rPr lang="pt-BR" sz="8800" b="1" dirty="0">
-                <a:solidFill>
-                  <a:srgbClr val="7030A0"/>
-                </a:solidFill>
-                <a:latin typeface="Impact" panose="020B0806030902050204" pitchFamily="34" charset="0"/>
-                <a:cs typeface="Arial" pitchFamily="34" charset="0"/>
-              </a:rPr>
-              <a:t>”</a:t>
-            </a:r>
-            <a:endParaRPr lang="pt-BR" sz="4800" b="1" dirty="0">
-              <a:solidFill>
-                <a:srgbClr val="7030A0"/>
-              </a:solidFill>
-              <a:latin typeface="Impact" panose="020B0806030902050204" pitchFamily="34" charset="0"/>
-              <a:cs typeface="Arial" pitchFamily="34" charset="0"/>
-            </a:endParaRPr>
-          </a:p>
-        </p:txBody>
-      </p:sp>
-    </p:spTree>
-    <p:extLst>
-      <p:ext uri="{BB962C8B-B14F-4D97-AF65-F5344CB8AC3E}">
-        <p14:creationId xmlns:p14="http://schemas.microsoft.com/office/powerpoint/2010/main" val="2699651162"/>
-      </p:ext>
-    </p:extLst>
-  </p:cSld>
-  <p:clrMapOvr>
-    <a:masterClrMapping/>
-  </p:clrMapOvr>
-</p:sld>
-</file>
-
-<file path=ppt/slides/slide3.xml><?xml version="1.0" encoding="utf-8"?>
 <p:sld xmlns:a="http://schemas.openxmlformats.org/drawingml/2006/main" xmlns:r="http://schemas.openxmlformats.org/officeDocument/2006/relationships" xmlns:p="http://schemas.openxmlformats.org/presentationml/2006/main">
   <p:cSld>
     <p:bg>
@@ -4152,6 +4409,185 @@
     <p:extLst>
       <p:ext uri="{BB962C8B-B14F-4D97-AF65-F5344CB8AC3E}">
         <p14:creationId xmlns:p14="http://schemas.microsoft.com/office/powerpoint/2010/main" val="1756824098"/>
+      </p:ext>
+    </p:extLst>
+  </p:cSld>
+  <p:clrMapOvr>
+    <a:masterClrMapping/>
+  </p:clrMapOvr>
+</p:sld>
+</file>
+
+<file path=ppt/slides/slide3.xml><?xml version="1.0" encoding="utf-8"?>
+<p:sld xmlns:a="http://schemas.openxmlformats.org/drawingml/2006/main" xmlns:r="http://schemas.openxmlformats.org/officeDocument/2006/relationships" xmlns:p="http://schemas.openxmlformats.org/presentationml/2006/main">
+  <p:cSld>
+    <p:spTree>
+      <p:nvGrpSpPr>
+        <p:cNvPr id="1" name=""/>
+        <p:cNvGrpSpPr/>
+        <p:nvPr/>
+      </p:nvGrpSpPr>
+      <p:grpSpPr>
+        <a:xfrm>
+          <a:off x="0" y="0"/>
+          <a:ext cx="0" cy="0"/>
+          <a:chOff x="0" y="0"/>
+          <a:chExt cx="0" cy="0"/>
+        </a:xfrm>
+      </p:grpSpPr>
+      <p:pic>
+        <p:nvPicPr>
+          <p:cNvPr id="1028" name="Picture 4" descr="Resultado de imagem para programação"/>
+          <p:cNvPicPr>
+            <a:picLocks noChangeAspect="1" noChangeArrowheads="1"/>
+          </p:cNvPicPr>
+          <p:nvPr/>
+        </p:nvPicPr>
+        <p:blipFill>
+          <a:blip r:embed="rId2">
+            <a:extLst>
+              <a:ext uri="{28A0092B-C50C-407E-A947-70E740481C1C}">
+                <a14:useLocalDpi xmlns:a14="http://schemas.microsoft.com/office/drawing/2010/main" val="0"/>
+              </a:ext>
+            </a:extLst>
+          </a:blip>
+          <a:srcRect/>
+          <a:stretch>
+            <a:fillRect/>
+          </a:stretch>
+        </p:blipFill>
+        <p:spPr bwMode="auto">
+          <a:xfrm>
+            <a:off x="0" y="9345"/>
+            <a:ext cx="9143998" cy="6857999"/>
+          </a:xfrm>
+          <a:prstGeom prst="rect">
+            <a:avLst/>
+          </a:prstGeom>
+          <a:noFill/>
+          <a:extLst>
+            <a:ext uri="{909E8E84-426E-40DD-AFC4-6F175D3DCCD1}">
+              <a14:hiddenFill xmlns:a14="http://schemas.microsoft.com/office/drawing/2010/main">
+                <a:solidFill>
+                  <a:srgbClr val="FFFFFF"/>
+                </a:solidFill>
+              </a14:hiddenFill>
+            </a:ext>
+          </a:extLst>
+        </p:spPr>
+      </p:pic>
+      <p:sp>
+        <p:nvSpPr>
+          <p:cNvPr id="3" name="Título 1">
+            <a:extLst>
+              <a:ext uri="{FF2B5EF4-FFF2-40B4-BE49-F238E27FC236}">
+                <a16:creationId xmlns:a16="http://schemas.microsoft.com/office/drawing/2014/main" id="{AD081224-7062-42D5-AC83-0BE27E97D9B3}"/>
+              </a:ext>
+            </a:extLst>
+          </p:cNvPr>
+          <p:cNvSpPr>
+            <a:spLocks noGrp="1"/>
+          </p:cNvSpPr>
+          <p:nvPr>
+            <p:ph type="ctrTitle"/>
+          </p:nvPr>
+        </p:nvSpPr>
+        <p:spPr>
+          <a:xfrm>
+            <a:off x="-2" y="2592288"/>
+            <a:ext cx="9144000" cy="1628800"/>
+          </a:xfrm>
+          <a:solidFill>
+            <a:srgbClr val="FFFF00"/>
+          </a:solidFill>
+        </p:spPr>
+        <p:txBody>
+          <a:bodyPr>
+            <a:noAutofit/>
+          </a:bodyPr>
+          <a:lstStyle/>
+          <a:p>
+            <a:r>
+              <a:rPr lang="pt-BR" sz="8800" b="1" dirty="0">
+                <a:solidFill>
+                  <a:srgbClr val="7030A0"/>
+                </a:solidFill>
+                <a:latin typeface="Impact" panose="020B0806030902050204" pitchFamily="34" charset="0"/>
+                <a:cs typeface="Arial" pitchFamily="34" charset="0"/>
+              </a:rPr>
+              <a:t>“</a:t>
+            </a:r>
+            <a:r>
+              <a:rPr lang="pt-BR" sz="8800" b="1" dirty="0">
+                <a:latin typeface="Impact" panose="020B0806030902050204" pitchFamily="34" charset="0"/>
+                <a:cs typeface="Arial" pitchFamily="34" charset="0"/>
+              </a:rPr>
+              <a:t>A</a:t>
+            </a:r>
+            <a:r>
+              <a:rPr lang="pt-BR" sz="8800" b="1" dirty="0">
+                <a:solidFill>
+                  <a:srgbClr val="00B050"/>
+                </a:solidFill>
+                <a:latin typeface="Impact" panose="020B0806030902050204" pitchFamily="34" charset="0"/>
+                <a:cs typeface="Arial" pitchFamily="34" charset="0"/>
+              </a:rPr>
+              <a:t>PRE</a:t>
+            </a:r>
+            <a:r>
+              <a:rPr lang="pt-BR" sz="8800" b="1" dirty="0">
+                <a:solidFill>
+                  <a:srgbClr val="7030A0"/>
+                </a:solidFill>
+                <a:latin typeface="Impact" panose="020B0806030902050204" pitchFamily="34" charset="0"/>
+                <a:cs typeface="Arial" pitchFamily="34" charset="0"/>
+              </a:rPr>
+              <a:t>SEN</a:t>
+            </a:r>
+            <a:r>
+              <a:rPr lang="pt-BR" sz="8800" b="1" dirty="0">
+                <a:solidFill>
+                  <a:srgbClr val="00B0F0"/>
+                </a:solidFill>
+                <a:latin typeface="Impact" panose="020B0806030902050204" pitchFamily="34" charset="0"/>
+                <a:cs typeface="Arial" pitchFamily="34" charset="0"/>
+              </a:rPr>
+              <a:t>TA</a:t>
+            </a:r>
+            <a:r>
+              <a:rPr lang="pt-BR" sz="8800" b="1" dirty="0">
+                <a:solidFill>
+                  <a:srgbClr val="FFC000"/>
+                </a:solidFill>
+                <a:latin typeface="Impact" panose="020B0806030902050204" pitchFamily="34" charset="0"/>
+                <a:cs typeface="Arial" pitchFamily="34" charset="0"/>
+              </a:rPr>
+              <a:t>ÇÃO</a:t>
+            </a:r>
+            <a:r>
+              <a:rPr lang="pt-BR" sz="8800" b="1" dirty="0">
+                <a:solidFill>
+                  <a:srgbClr val="7030A0"/>
+                </a:solidFill>
+                <a:latin typeface="Impact" panose="020B0806030902050204" pitchFamily="34" charset="0"/>
+                <a:cs typeface="Arial" pitchFamily="34" charset="0"/>
+              </a:rPr>
+              <a:t>”</a:t>
+            </a:r>
+            <a:endParaRPr lang="pt-BR" sz="4800" b="1" dirty="0">
+              <a:solidFill>
+                <a:srgbClr val="7030A0"/>
+              </a:solidFill>
+              <a:latin typeface="Impact" panose="020B0806030902050204" pitchFamily="34" charset="0"/>
+              <a:cs typeface="Arial" pitchFamily="34" charset="0"/>
+            </a:endParaRPr>
+          </a:p>
+        </p:txBody>
+      </p:sp>
+    </p:spTree>
+    <p:extLst>
+      <p:ext uri="{BB962C8B-B14F-4D97-AF65-F5344CB8AC3E}">
+        <p14:creationId xmlns:p14="http://schemas.microsoft.com/office/powerpoint/2010/main" val="2699651162"/>
       </p:ext>
     </p:extLst>
   </p:cSld>
@@ -5009,4 +5445,319 @@
   <a:objectDefaults/>
   <a:extraClrSchemeLst/>
 </a:theme>
+</file>
+
+<file path=ppt/theme/theme2.xml><?xml version="1.0" encoding="utf-8"?>
+<a:theme xmlns:a="http://schemas.openxmlformats.org/drawingml/2006/main" name="Tema do Office">
+  <a:themeElements>
+    <a:clrScheme name="Office">
+      <a:dk1>
+        <a:sysClr val="windowText" lastClr="000000"/>
+      </a:dk1>
+      <a:lt1>
+        <a:sysClr val="window" lastClr="FFFFFF"/>
+      </a:lt1>
+      <a:dk2>
+        <a:srgbClr val="0E2841"/>
+      </a:dk2>
+      <a:lt2>
+        <a:srgbClr val="E8E8E8"/>
+      </a:lt2>
+      <a:accent1>
+        <a:srgbClr val="156082"/>
+      </a:accent1>
+      <a:accent2>
+        <a:srgbClr val="E97132"/>
+      </a:accent2>
+      <a:accent3>
+        <a:srgbClr val="196B24"/>
+      </a:accent3>
+      <a:accent4>
+        <a:srgbClr val="0F9ED5"/>
+      </a:accent4>
+      <a:accent5>
+        <a:srgbClr val="A02B93"/>
+      </a:accent5>
+      <a:accent6>
+        <a:srgbClr val="4EA72E"/>
+      </a:accent6>
+      <a:hlink>
+        <a:srgbClr val="467886"/>
+      </a:hlink>
+      <a:folHlink>
+        <a:srgbClr val="96607D"/>
+      </a:folHlink>
+    </a:clrScheme>
+    <a:fontScheme name="Office">
+      <a:majorFont>
+        <a:latin typeface="Aptos Display" panose="02110004020202020204"/>
+        <a:ea typeface=""/>
+        <a:cs typeface=""/>
+        <a:font script="Jpan" typeface="游ゴシック Light"/>
+        <a:font script="Hang" typeface="맑은 고딕"/>
+        <a:font script="Hans" typeface="等线 Light"/>
+        <a:font script="Hant" typeface="新細明體"/>
+        <a:font script="Arab" typeface="Times New Roman"/>
+        <a:font script="Hebr" typeface="Times New Roman"/>
+        <a:font script="Thai" typeface="Angsana New"/>
+        <a:font script="Ethi" typeface="Nyala"/>
+        <a:font script="Beng" typeface="Vrinda"/>
+        <a:font script="Gujr" typeface="Shruti"/>
+        <a:font script="Khmr" typeface="MoolBoran"/>
+        <a:font script="Knda" typeface="Tunga"/>
+        <a:font script="Guru" typeface="Raavi"/>
+        <a:font script="Cans" typeface="Euphemia"/>
+        <a:font script="Cher" typeface="Plantagenet Cherokee"/>
+        <a:font script="Yiii" typeface="Microsoft Yi Baiti"/>
+        <a:font script="Tibt" typeface="Microsoft Himalaya"/>
+        <a:font script="Thaa" typeface="MV Boli"/>
+        <a:font script="Deva" typeface="Mangal"/>
+        <a:font script="Telu" typeface="Gautami"/>
+        <a:font script="Taml" typeface="Latha"/>
+        <a:font script="Syrc" typeface="Estrangelo Edessa"/>
+        <a:font script="Orya" typeface="Kalinga"/>
+        <a:font script="Mlym" typeface="Kartika"/>
+        <a:font script="Laoo" typeface="DokChampa"/>
+        <a:font script="Sinh" typeface="Iskoola Pota"/>
+        <a:font script="Mong" typeface="Mongolian Baiti"/>
+        <a:font script="Viet" typeface="Times New Roman"/>
+        <a:font script="Uigh" typeface="Microsoft Uighur"/>
+        <a:font script="Geor" typeface="Sylfaen"/>
+        <a:font script="Armn" typeface="Arial"/>
+        <a:font script="Bugi" typeface="Leelawadee UI"/>
+        <a:font script="Bopo" typeface="Microsoft JhengHei"/>
+        <a:font script="Java" typeface="Javanese Text"/>
+        <a:font script="Lisu" typeface="Segoe UI"/>
+        <a:font script="Mymr" typeface="Myanmar Text"/>
+        <a:font script="Nkoo" typeface="Ebrima"/>
+        <a:font script="Olck" typeface="Nirmala UI"/>
+        <a:font script="Osma" typeface="Ebrima"/>
+        <a:font script="Phag" typeface="Phagspa"/>
+        <a:font script="Syrn" typeface="Estrangelo Edessa"/>
+        <a:font script="Syrj" typeface="Estrangelo Edessa"/>
+        <a:font script="Syre" typeface="Estrangelo Edessa"/>
+        <a:font script="Sora" typeface="Nirmala UI"/>
+        <a:font script="Tale" typeface="Microsoft Tai Le"/>
+        <a:font script="Talu" typeface="Microsoft New Tai Lue"/>
+        <a:font script="Tfng" typeface="Ebrima"/>
+      </a:majorFont>
+      <a:minorFont>
+        <a:latin typeface="Aptos" panose="02110004020202020204"/>
+        <a:ea typeface=""/>
+        <a:cs typeface=""/>
+        <a:font script="Jpan" typeface="游ゴシック"/>
+        <a:font script="Hang" typeface="맑은 고딕"/>
+        <a:font script="Hans" typeface="等线"/>
+        <a:font script="Hant" typeface="新細明體"/>
+        <a:font script="Arab" typeface="Arial"/>
+        <a:font script="Hebr" typeface="Arial"/>
+        <a:font script="Thai" typeface="Cordia New"/>
+        <a:font script="Ethi" typeface="Nyala"/>
+        <a:font script="Beng" typeface="Vrinda"/>
+        <a:font script="Gujr" typeface="Shruti"/>
+        <a:font script="Khmr" typeface="DaunPenh"/>
+        <a:font script="Knda" typeface="Tunga"/>
+        <a:font script="Guru" typeface="Raavi"/>
+        <a:font script="Cans" typeface="Euphemia"/>
+        <a:font script="Cher" typeface="Plantagenet Cherokee"/>
+        <a:font script="Yiii" typeface="Microsoft Yi Baiti"/>
+        <a:font script="Tibt" typeface="Microsoft Himalaya"/>
+        <a:font script="Thaa" typeface="MV Boli"/>
+        <a:font script="Deva" typeface="Mangal"/>
+        <a:font script="Telu" typeface="Gautami"/>
+        <a:font script="Taml" typeface="Latha"/>
+        <a:font script="Syrc" typeface="Estrangelo Edessa"/>
+        <a:font script="Orya" typeface="Kalinga"/>
+        <a:font script="Mlym" typeface="Kartika"/>
+        <a:font script="Laoo" typeface="DokChampa"/>
+        <a:font script="Sinh" typeface="Iskoola Pota"/>
+        <a:font script="Mong" typeface="Mongolian Baiti"/>
+        <a:font script="Viet" typeface="Arial"/>
+        <a:font script="Uigh" typeface="Microsoft Uighur"/>
+        <a:font script="Geor" typeface="Sylfaen"/>
+        <a:font script="Armn" typeface="Arial"/>
+        <a:font script="Bugi" typeface="Leelawadee UI"/>
+        <a:font script="Bopo" typeface="Microsoft JhengHei"/>
+        <a:font script="Java" typeface="Javanese Text"/>
+        <a:font script="Lisu" typeface="Segoe UI"/>
+        <a:font script="Mymr" typeface="Myanmar Text"/>
+        <a:font script="Nkoo" typeface="Ebrima"/>
+        <a:font script="Olck" typeface="Nirmala UI"/>
+        <a:font script="Osma" typeface="Ebrima"/>
+        <a:font script="Phag" typeface="Phagspa"/>
+        <a:font script="Syrn" typeface="Estrangelo Edessa"/>
+        <a:font script="Syrj" typeface="Estrangelo Edessa"/>
+        <a:font script="Syre" typeface="Estrangelo Edessa"/>
+        <a:font script="Sora" typeface="Nirmala UI"/>
+        <a:font script="Tale" typeface="Microsoft Tai Le"/>
+        <a:font script="Talu" typeface="Microsoft New Tai Lue"/>
+        <a:font script="Tfng" typeface="Ebrima"/>
+      </a:minorFont>
+    </a:fontScheme>
+    <a:fmtScheme name="Office">
+      <a:fillStyleLst>
+        <a:solidFill>
+          <a:schemeClr val="phClr"/>
+        </a:solidFill>
+        <a:gradFill rotWithShape="1">
+          <a:gsLst>
+            <a:gs pos="0">
+              <a:schemeClr val="phClr">
+                <a:lumMod val="110000"/>
+                <a:satMod val="105000"/>
+                <a:tint val="67000"/>
+              </a:schemeClr>
+            </a:gs>
+            <a:gs pos="50000">
+              <a:schemeClr val="phClr">
+                <a:lumMod val="105000"/>
+                <a:satMod val="103000"/>
+                <a:tint val="73000"/>
+              </a:schemeClr>
+            </a:gs>
+            <a:gs pos="100000">
+              <a:schemeClr val="phClr">
+                <a:lumMod val="105000"/>
+                <a:satMod val="109000"/>
+                <a:tint val="81000"/>
+              </a:schemeClr>
+            </a:gs>
+          </a:gsLst>
+          <a:lin ang="5400000" scaled="0"/>
+        </a:gradFill>
+        <a:gradFill rotWithShape="1">
+          <a:gsLst>
+            <a:gs pos="0">
+              <a:schemeClr val="phClr">
+                <a:satMod val="103000"/>
+                <a:lumMod val="102000"/>
+                <a:tint val="94000"/>
+              </a:schemeClr>
+            </a:gs>
+            <a:gs pos="50000">
+              <a:schemeClr val="phClr">
+                <a:satMod val="110000"/>
+                <a:lumMod val="100000"/>
+                <a:shade val="100000"/>
+              </a:schemeClr>
+            </a:gs>
+            <a:gs pos="100000">
+              <a:schemeClr val="phClr">
+                <a:lumMod val="99000"/>
+                <a:satMod val="120000"/>
+                <a:shade val="78000"/>
+              </a:schemeClr>
+            </a:gs>
+          </a:gsLst>
+          <a:lin ang="5400000" scaled="0"/>
+        </a:gradFill>
+      </a:fillStyleLst>
+      <a:lnStyleLst>
+        <a:ln w="12700" cap="flat" cmpd="sng" algn="ctr">
+          <a:solidFill>
+            <a:schemeClr val="phClr"/>
+          </a:solidFill>
+          <a:prstDash val="solid"/>
+          <a:miter lim="800000"/>
+        </a:ln>
+        <a:ln w="19050" cap="flat" cmpd="sng" algn="ctr">
+          <a:solidFill>
+            <a:schemeClr val="phClr"/>
+          </a:solidFill>
+          <a:prstDash val="solid"/>
+          <a:miter lim="800000"/>
+        </a:ln>
+        <a:ln w="25400" cap="flat" cmpd="sng" algn="ctr">
+          <a:solidFill>
+            <a:schemeClr val="phClr"/>
+          </a:solidFill>
+          <a:prstDash val="solid"/>
+          <a:miter lim="800000"/>
+        </a:ln>
+      </a:lnStyleLst>
+      <a:effectStyleLst>
+        <a:effectStyle>
+          <a:effectLst/>
+        </a:effectStyle>
+        <a:effectStyle>
+          <a:effectLst/>
+        </a:effectStyle>
+        <a:effectStyle>
+          <a:effectLst>
+            <a:outerShdw blurRad="57150" dist="19050" dir="5400000" algn="ctr" rotWithShape="0">
+              <a:srgbClr val="000000">
+                <a:alpha val="63000"/>
+              </a:srgbClr>
+            </a:outerShdw>
+          </a:effectLst>
+        </a:effectStyle>
+      </a:effectStyleLst>
+      <a:bgFillStyleLst>
+        <a:solidFill>
+          <a:schemeClr val="phClr"/>
+        </a:solidFill>
+        <a:solidFill>
+          <a:schemeClr val="phClr">
+            <a:tint val="95000"/>
+            <a:satMod val="170000"/>
+          </a:schemeClr>
+        </a:solidFill>
+        <a:gradFill rotWithShape="1">
+          <a:gsLst>
+            <a:gs pos="0">
+              <a:schemeClr val="phClr">
+                <a:tint val="93000"/>
+                <a:satMod val="150000"/>
+                <a:shade val="98000"/>
+                <a:lumMod val="102000"/>
+              </a:schemeClr>
+            </a:gs>
+            <a:gs pos="50000">
+              <a:schemeClr val="phClr">
+                <a:tint val="98000"/>
+                <a:satMod val="130000"/>
+                <a:shade val="90000"/>
+                <a:lumMod val="103000"/>
+              </a:schemeClr>
+            </a:gs>
+            <a:gs pos="100000">
+              <a:schemeClr val="phClr">
+                <a:shade val="63000"/>
+                <a:satMod val="120000"/>
+              </a:schemeClr>
+            </a:gs>
+          </a:gsLst>
+          <a:lin ang="5400000" scaled="0"/>
+        </a:gradFill>
+      </a:bgFillStyleLst>
+    </a:fmtScheme>
+  </a:themeElements>
+  <a:objectDefaults>
+    <a:lnDef>
+      <a:spPr/>
+      <a:bodyPr/>
+      <a:lstStyle/>
+      <a:style>
+        <a:lnRef idx="2">
+          <a:schemeClr val="accent1"/>
+        </a:lnRef>
+        <a:fillRef idx="0">
+          <a:schemeClr val="accent1"/>
+        </a:fillRef>
+        <a:effectRef idx="1">
+          <a:schemeClr val="accent1"/>
+        </a:effectRef>
+        <a:fontRef idx="minor">
+          <a:schemeClr val="tx1"/>
+        </a:fontRef>
+      </a:style>
+    </a:lnDef>
+  </a:objectDefaults>
+  <a:extraClrSchemeLst/>
+  <a:extLst>
+    <a:ext uri="{05A4C25C-085E-4340-85A3-A5531E510DB2}">
+      <thm15:themeFamily xmlns:thm15="http://schemas.microsoft.com/office/thememl/2012/main" name="Office Theme" id="{2E142A2C-CD16-42D6-873A-C26D2A0506FA}" vid="{1BDDFF52-6CD6-40A5-AB3C-68EB2F1E4D0A}"/>
+    </a:ext>
+  </a:extLst>
+</a:theme>
 </file>
</xml_diff>